<commit_message>
ADD : Sub Files For PPT
</commit_message>
<xml_diff>
--- a/1512035 류주성/1512035 류주성.pptx
+++ b/1512035 류주성/1512035 류주성.pptx
@@ -13,8 +13,7 @@
     <p:sldId id="261" r:id="rId7"/>
     <p:sldId id="262" r:id="rId8"/>
     <p:sldId id="263" r:id="rId9"/>
-    <p:sldId id="264" r:id="rId10"/>
-    <p:sldId id="257" r:id="rId11"/>
+    <p:sldId id="257" r:id="rId10"/>
   </p:sldIdLst>
   <p:sldSz cx="12192000" cy="6858000"/>
   <p:notesSz cx="6858000" cy="9144000"/>
@@ -113,6 +112,11 @@
       </a:defRPr>
     </a:lvl9pPr>
   </p:defaultTextStyle>
+  <p:extLst>
+    <p:ext uri="{EFAFB233-063F-42B5-8137-9DF3F51BA10A}">
+      <p15:sldGuideLst xmlns:p15="http://schemas.microsoft.com/office/powerpoint/2012/main"/>
+    </p:ext>
+  </p:extLst>
 </p:presentation>
 </file>
 
@@ -263,7 +267,7 @@
           <a:p>
             <a:fld id="{116C0F29-39C1-4EE1-9F63-180AE8DA4680}" type="datetimeFigureOut">
               <a:rPr lang="ko-KR" altLang="en-US" smtClean="0"/>
-              <a:t>2020-07-03</a:t>
+              <a:t>2020-07-04</a:t>
             </a:fld>
             <a:endParaRPr lang="ko-KR" altLang="en-US"/>
           </a:p>
@@ -461,7 +465,7 @@
           <a:p>
             <a:fld id="{116C0F29-39C1-4EE1-9F63-180AE8DA4680}" type="datetimeFigureOut">
               <a:rPr lang="ko-KR" altLang="en-US" smtClean="0"/>
-              <a:t>2020-07-03</a:t>
+              <a:t>2020-07-04</a:t>
             </a:fld>
             <a:endParaRPr lang="ko-KR" altLang="en-US"/>
           </a:p>
@@ -669,7 +673,7 @@
           <a:p>
             <a:fld id="{116C0F29-39C1-4EE1-9F63-180AE8DA4680}" type="datetimeFigureOut">
               <a:rPr lang="ko-KR" altLang="en-US" smtClean="0"/>
-              <a:t>2020-07-03</a:t>
+              <a:t>2020-07-04</a:t>
             </a:fld>
             <a:endParaRPr lang="ko-KR" altLang="en-US"/>
           </a:p>
@@ -867,7 +871,7 @@
           <a:p>
             <a:fld id="{116C0F29-39C1-4EE1-9F63-180AE8DA4680}" type="datetimeFigureOut">
               <a:rPr lang="ko-KR" altLang="en-US" smtClean="0"/>
-              <a:t>2020-07-03</a:t>
+              <a:t>2020-07-04</a:t>
             </a:fld>
             <a:endParaRPr lang="ko-KR" altLang="en-US"/>
           </a:p>
@@ -1142,7 +1146,7 @@
           <a:p>
             <a:fld id="{116C0F29-39C1-4EE1-9F63-180AE8DA4680}" type="datetimeFigureOut">
               <a:rPr lang="ko-KR" altLang="en-US" smtClean="0"/>
-              <a:t>2020-07-03</a:t>
+              <a:t>2020-07-04</a:t>
             </a:fld>
             <a:endParaRPr lang="ko-KR" altLang="en-US"/>
           </a:p>
@@ -1407,7 +1411,7 @@
           <a:p>
             <a:fld id="{116C0F29-39C1-4EE1-9F63-180AE8DA4680}" type="datetimeFigureOut">
               <a:rPr lang="ko-KR" altLang="en-US" smtClean="0"/>
-              <a:t>2020-07-03</a:t>
+              <a:t>2020-07-04</a:t>
             </a:fld>
             <a:endParaRPr lang="ko-KR" altLang="en-US"/>
           </a:p>
@@ -1819,7 +1823,7 @@
           <a:p>
             <a:fld id="{116C0F29-39C1-4EE1-9F63-180AE8DA4680}" type="datetimeFigureOut">
               <a:rPr lang="ko-KR" altLang="en-US" smtClean="0"/>
-              <a:t>2020-07-03</a:t>
+              <a:t>2020-07-04</a:t>
             </a:fld>
             <a:endParaRPr lang="ko-KR" altLang="en-US"/>
           </a:p>
@@ -1960,7 +1964,7 @@
           <a:p>
             <a:fld id="{116C0F29-39C1-4EE1-9F63-180AE8DA4680}" type="datetimeFigureOut">
               <a:rPr lang="ko-KR" altLang="en-US" smtClean="0"/>
-              <a:t>2020-07-03</a:t>
+              <a:t>2020-07-04</a:t>
             </a:fld>
             <a:endParaRPr lang="ko-KR" altLang="en-US"/>
           </a:p>
@@ -2073,7 +2077,7 @@
           <a:p>
             <a:fld id="{116C0F29-39C1-4EE1-9F63-180AE8DA4680}" type="datetimeFigureOut">
               <a:rPr lang="ko-KR" altLang="en-US" smtClean="0"/>
-              <a:t>2020-07-03</a:t>
+              <a:t>2020-07-04</a:t>
             </a:fld>
             <a:endParaRPr lang="ko-KR" altLang="en-US"/>
           </a:p>
@@ -2384,7 +2388,7 @@
           <a:p>
             <a:fld id="{116C0F29-39C1-4EE1-9F63-180AE8DA4680}" type="datetimeFigureOut">
               <a:rPr lang="ko-KR" altLang="en-US" smtClean="0"/>
-              <a:t>2020-07-03</a:t>
+              <a:t>2020-07-04</a:t>
             </a:fld>
             <a:endParaRPr lang="ko-KR" altLang="en-US"/>
           </a:p>
@@ -2672,7 +2676,7 @@
           <a:p>
             <a:fld id="{116C0F29-39C1-4EE1-9F63-180AE8DA4680}" type="datetimeFigureOut">
               <a:rPr lang="ko-KR" altLang="en-US" smtClean="0"/>
-              <a:t>2020-07-03</a:t>
+              <a:t>2020-07-04</a:t>
             </a:fld>
             <a:endParaRPr lang="ko-KR" altLang="en-US"/>
           </a:p>
@@ -2913,7 +2917,7 @@
           <a:p>
             <a:fld id="{116C0F29-39C1-4EE1-9F63-180AE8DA4680}" type="datetimeFigureOut">
               <a:rPr lang="ko-KR" altLang="en-US" smtClean="0"/>
-              <a:t>2020-07-03</a:t>
+              <a:t>2020-07-04</a:t>
             </a:fld>
             <a:endParaRPr lang="ko-KR" altLang="en-US"/>
           </a:p>
@@ -3423,177 +3427,6 @@
 </p:sld>
 </file>
 
-<file path=ppt/slides/slide10.xml><?xml version="1.0" encoding="utf-8"?>
-<p:sld xmlns:a="http://schemas.openxmlformats.org/drawingml/2006/main" xmlns:r="http://schemas.openxmlformats.org/officeDocument/2006/relationships" xmlns:p="http://schemas.openxmlformats.org/presentationml/2006/main">
-  <p:cSld>
-    <p:spTree>
-      <p:nvGrpSpPr>
-        <p:cNvPr id="1" name=""/>
-        <p:cNvGrpSpPr/>
-        <p:nvPr/>
-      </p:nvGrpSpPr>
-      <p:grpSpPr>
-        <a:xfrm>
-          <a:off x="0" y="0"/>
-          <a:ext cx="0" cy="0"/>
-          <a:chOff x="0" y="0"/>
-          <a:chExt cx="0" cy="0"/>
-        </a:xfrm>
-      </p:grpSpPr>
-      <p:sp>
-        <p:nvSpPr>
-          <p:cNvPr id="2" name="제목 1">
-            <a:extLst>
-              <a:ext uri="{FF2B5EF4-FFF2-40B4-BE49-F238E27FC236}">
-                <a16:creationId xmlns:a16="http://schemas.microsoft.com/office/drawing/2014/main" id="{E8D9A388-2E59-4EB1-9343-3D0B67EFF246}"/>
-              </a:ext>
-            </a:extLst>
-          </p:cNvPr>
-          <p:cNvSpPr>
-            <a:spLocks noGrp="1"/>
-          </p:cNvSpPr>
-          <p:nvPr>
-            <p:ph type="title"/>
-          </p:nvPr>
-        </p:nvSpPr>
-        <p:spPr/>
-        <p:txBody>
-          <a:bodyPr/>
-          <a:lstStyle/>
-          <a:p>
-            <a:r>
-              <a:rPr lang="ko-KR" altLang="en-US" dirty="0"/>
-              <a:t>후기</a:t>
-            </a:r>
-          </a:p>
-        </p:txBody>
-      </p:sp>
-      <p:sp>
-        <p:nvSpPr>
-          <p:cNvPr id="3" name="내용 개체 틀 2">
-            <a:extLst>
-              <a:ext uri="{FF2B5EF4-FFF2-40B4-BE49-F238E27FC236}">
-                <a16:creationId xmlns:a16="http://schemas.microsoft.com/office/drawing/2014/main" id="{7AB142D8-329A-489E-83AB-235A7C9456FD}"/>
-              </a:ext>
-            </a:extLst>
-          </p:cNvPr>
-          <p:cNvSpPr>
-            <a:spLocks noGrp="1"/>
-          </p:cNvSpPr>
-          <p:nvPr>
-            <p:ph idx="1"/>
-          </p:nvPr>
-        </p:nvSpPr>
-        <p:spPr/>
-        <p:txBody>
-          <a:bodyPr/>
-          <a:lstStyle/>
-          <a:p>
-            <a:r>
-              <a:rPr lang="ko-KR" altLang="en-US" dirty="0"/>
-              <a:t>구현 하기로 한 목표인 </a:t>
-            </a:r>
-            <a:r>
-              <a:rPr lang="en-US" altLang="ko-KR" dirty="0"/>
-              <a:t>Status</a:t>
-            </a:r>
-            <a:r>
-              <a:rPr lang="ko-KR" altLang="en-US" dirty="0"/>
-              <a:t>에서도 </a:t>
-            </a:r>
-            <a:endParaRPr lang="en-US" altLang="ko-KR" dirty="0"/>
-          </a:p>
-          <a:p>
-            <a:pPr lvl="1"/>
-            <a:r>
-              <a:rPr lang="ko-KR" altLang="en-US" dirty="0"/>
-              <a:t>간단한 정보 </a:t>
-            </a:r>
-            <a:r>
-              <a:rPr lang="en-US" altLang="ko-KR" dirty="0"/>
-              <a:t>: </a:t>
-            </a:r>
-            <a:r>
-              <a:rPr lang="ko-KR" altLang="en-US" dirty="0"/>
-              <a:t>구현완료</a:t>
-            </a:r>
-            <a:endParaRPr lang="en-US" altLang="ko-KR" dirty="0"/>
-          </a:p>
-          <a:p>
-            <a:pPr lvl="1"/>
-            <a:r>
-              <a:rPr lang="en-US" altLang="ko-KR" dirty="0"/>
-              <a:t> </a:t>
-            </a:r>
-            <a:r>
-              <a:rPr lang="ko-KR" altLang="en-US" dirty="0"/>
-              <a:t>세부 정보 </a:t>
-            </a:r>
-            <a:r>
-              <a:rPr lang="en-US" altLang="ko-KR" dirty="0"/>
-              <a:t>: </a:t>
-            </a:r>
-            <a:r>
-              <a:rPr lang="ko-KR" altLang="en-US" dirty="0" err="1"/>
-              <a:t>미구현</a:t>
-            </a:r>
-            <a:endParaRPr lang="en-US" altLang="ko-KR" dirty="0"/>
-          </a:p>
-          <a:p>
-            <a:r>
-              <a:rPr lang="en-US" altLang="ko-KR" dirty="0"/>
-              <a:t>Skill </a:t>
-            </a:r>
-            <a:r>
-              <a:rPr lang="ko-KR" altLang="en-US" dirty="0"/>
-              <a:t>또한 </a:t>
-            </a:r>
-            <a:r>
-              <a:rPr lang="ko-KR" altLang="en-US" dirty="0" err="1"/>
-              <a:t>미구현</a:t>
-            </a:r>
-            <a:endParaRPr lang="en-US" altLang="ko-KR" dirty="0"/>
-          </a:p>
-          <a:p>
-            <a:endParaRPr lang="en-US" altLang="ko-KR" dirty="0"/>
-          </a:p>
-          <a:p>
-            <a:r>
-              <a:rPr lang="ko-KR" altLang="en-US" dirty="0"/>
-              <a:t>생각 외로 간단하게 </a:t>
-            </a:r>
-            <a:r>
-              <a:rPr lang="en-US" altLang="ko-KR" dirty="0"/>
-              <a:t>Status Ability Point</a:t>
-            </a:r>
-            <a:r>
-              <a:rPr lang="ko-KR" altLang="en-US" dirty="0"/>
-              <a:t>를 </a:t>
-            </a:r>
-            <a:r>
-              <a:rPr lang="ko-KR" altLang="en-US" dirty="0" err="1"/>
-              <a:t>구현하는것만으로도</a:t>
-            </a:r>
-            <a:r>
-              <a:rPr lang="ko-KR" altLang="en-US" dirty="0"/>
-              <a:t> 시간이 많이 걸림</a:t>
-            </a:r>
-          </a:p>
-        </p:txBody>
-      </p:sp>
-    </p:spTree>
-    <p:extLst>
-      <p:ext uri="{BB962C8B-B14F-4D97-AF65-F5344CB8AC3E}">
-        <p14:creationId xmlns:p14="http://schemas.microsoft.com/office/powerpoint/2010/main" val="1446599164"/>
-      </p:ext>
-    </p:extLst>
-  </p:cSld>
-  <p:clrMapOvr>
-    <a:masterClrMapping/>
-  </p:clrMapOvr>
-</p:sld>
-</file>
-
 <file path=ppt/slides/slide2.xml><?xml version="1.0" encoding="utf-8"?>
 <p:sld xmlns:a="http://schemas.openxmlformats.org/drawingml/2006/main" xmlns:r="http://schemas.openxmlformats.org/officeDocument/2006/relationships" xmlns:p="http://schemas.openxmlformats.org/presentationml/2006/main">
   <p:cSld>
@@ -3722,19 +3555,27 @@
             </a:r>
             <a:r>
               <a:rPr lang="en-US" altLang="ko-KR" dirty="0"/>
+              <a:t> </a:t>
+            </a:r>
+            <a:r>
+              <a:rPr lang="ko-KR" altLang="en-US" dirty="0"/>
+              <a:t>및</a:t>
+            </a:r>
+            <a:r>
+              <a:rPr lang="en-US" altLang="ko-KR" dirty="0"/>
+              <a:t> </a:t>
+            </a:r>
+            <a:r>
+              <a:rPr lang="ko-KR" altLang="en-US" dirty="0" err="1"/>
+              <a:t>앱실행</a:t>
+            </a:r>
+            <a:r>
+              <a:rPr lang="en-US" altLang="ko-KR" dirty="0"/>
               <a:t>, Activity </a:t>
             </a:r>
             <a:r>
               <a:rPr lang="ko-KR" altLang="en-US" dirty="0"/>
               <a:t>작업 흐름</a:t>
-            </a:r>
-            <a:r>
-              <a:rPr lang="en-US" altLang="ko-KR" dirty="0"/>
-              <a:t>, </a:t>
-            </a:r>
-            <a:r>
-              <a:rPr lang="ko-KR" altLang="en-US" dirty="0" err="1"/>
-              <a:t>앱실행</a:t>
             </a:r>
             <a:r>
               <a:rPr lang="en-US" altLang="ko-KR" dirty="0"/>
@@ -4850,31 +4691,41 @@
           </a:p>
         </p:txBody>
       </p:sp>
-      <p:sp>
-        <p:nvSpPr>
-          <p:cNvPr id="3" name="내용 개체 틀 2">
-            <a:extLst>
-              <a:ext uri="{FF2B5EF4-FFF2-40B4-BE49-F238E27FC236}">
-                <a16:creationId xmlns:a16="http://schemas.microsoft.com/office/drawing/2014/main" id="{9BA5D9A5-7039-4CD3-A062-F0A22644AC07}"/>
-              </a:ext>
-            </a:extLst>
-          </p:cNvPr>
-          <p:cNvSpPr>
-            <a:spLocks noGrp="1"/>
-          </p:cNvSpPr>
+      <p:pic>
+        <p:nvPicPr>
+          <p:cNvPr id="7" name="내용 개체 틀 6">
+            <a:extLst>
+              <a:ext uri="{FF2B5EF4-FFF2-40B4-BE49-F238E27FC236}">
+                <a16:creationId xmlns:a16="http://schemas.microsoft.com/office/drawing/2014/main" id="{16F35792-AB8E-49FC-9CC3-F62D748AFB3A}"/>
+              </a:ext>
+            </a:extLst>
+          </p:cNvPr>
+          <p:cNvPicPr>
+            <a:picLocks noGrp="1" noChangeAspect="1"/>
+          </p:cNvPicPr>
           <p:nvPr>
             <p:ph idx="1"/>
           </p:nvPr>
-        </p:nvSpPr>
-        <p:spPr/>
-        <p:txBody>
-          <a:bodyPr/>
-          <a:lstStyle/>
-          <a:p>
-            <a:endParaRPr lang="ko-KR" altLang="en-US"/>
-          </a:p>
-        </p:txBody>
-      </p:sp>
+        </p:nvPicPr>
+        <p:blipFill>
+          <a:blip r:embed="rId2">
+            <a:extLst>
+              <a:ext uri="{28A0092B-C50C-407E-A947-70E740481C1C}">
+                <a14:useLocalDpi xmlns:a14="http://schemas.microsoft.com/office/drawing/2010/main" val="0"/>
+              </a:ext>
+            </a:extLst>
+          </a:blip>
+          <a:stretch>
+            <a:fillRect/>
+          </a:stretch>
+        </p:blipFill>
+        <p:spPr>
+          <a:xfrm>
+            <a:off x="3007059" y="1825625"/>
+            <a:ext cx="6177882" cy="4351338"/>
+          </a:xfrm>
+        </p:spPr>
+      </p:pic>
     </p:spTree>
     <p:extLst>
       <p:ext uri="{BB962C8B-B14F-4D97-AF65-F5344CB8AC3E}">
@@ -4936,33 +4787,240 @@
             </a:r>
             <a:r>
               <a:rPr lang="ko-KR" altLang="en-US" dirty="0"/>
-              <a:t>설계</a:t>
-            </a:r>
-          </a:p>
-        </p:txBody>
-      </p:sp>
-      <p:sp>
-        <p:nvSpPr>
-          <p:cNvPr id="3" name="내용 개체 틀 2">
-            <a:extLst>
-              <a:ext uri="{FF2B5EF4-FFF2-40B4-BE49-F238E27FC236}">
-                <a16:creationId xmlns:a16="http://schemas.microsoft.com/office/drawing/2014/main" id="{9BA5D9A5-7039-4CD3-A062-F0A22644AC07}"/>
-              </a:ext>
-            </a:extLst>
-          </p:cNvPr>
-          <p:cNvSpPr>
-            <a:spLocks noGrp="1"/>
-          </p:cNvSpPr>
-          <p:nvPr>
-            <p:ph idx="1"/>
-          </p:nvPr>
-        </p:nvSpPr>
-        <p:spPr/>
-        <p:txBody>
-          <a:bodyPr/>
-          <a:lstStyle/>
-          <a:p>
-            <a:endParaRPr lang="ko-KR" altLang="en-US"/>
+              <a:t>설계 및 실행</a:t>
+            </a:r>
+          </a:p>
+        </p:txBody>
+      </p:sp>
+      <p:pic>
+        <p:nvPicPr>
+          <p:cNvPr id="32" name="그림 31" descr="스크린샷, 전화, 휴대폰, 모니터이(가) 표시된 사진&#10;&#10;자동 생성된 설명">
+            <a:extLst>
+              <a:ext uri="{FF2B5EF4-FFF2-40B4-BE49-F238E27FC236}">
+                <a16:creationId xmlns:a16="http://schemas.microsoft.com/office/drawing/2014/main" id="{5BCBA904-8A7E-428F-A8EE-9CA316486490}"/>
+              </a:ext>
+            </a:extLst>
+          </p:cNvPr>
+          <p:cNvPicPr>
+            <a:picLocks noChangeAspect="1"/>
+          </p:cNvPicPr>
+          <p:nvPr/>
+        </p:nvPicPr>
+        <p:blipFill>
+          <a:blip r:embed="rId2">
+            <a:extLst>
+              <a:ext uri="{28A0092B-C50C-407E-A947-70E740481C1C}">
+                <a14:useLocalDpi xmlns:a14="http://schemas.microsoft.com/office/drawing/2010/main" val="0"/>
+              </a:ext>
+            </a:extLst>
+          </a:blip>
+          <a:stretch>
+            <a:fillRect/>
+          </a:stretch>
+        </p:blipFill>
+        <p:spPr>
+          <a:xfrm>
+            <a:off x="4888356" y="1690688"/>
+            <a:ext cx="2390515" cy="4422710"/>
+          </a:xfrm>
+          <a:prstGeom prst="rect">
+            <a:avLst/>
+          </a:prstGeom>
+        </p:spPr>
+      </p:pic>
+      <p:pic>
+        <p:nvPicPr>
+          <p:cNvPr id="34" name="그림 33" descr="스크린샷, 전화, 휴대폰, 모니터이(가) 표시된 사진&#10;&#10;자동 생성된 설명">
+            <a:extLst>
+              <a:ext uri="{FF2B5EF4-FFF2-40B4-BE49-F238E27FC236}">
+                <a16:creationId xmlns:a16="http://schemas.microsoft.com/office/drawing/2014/main" id="{E28D2F42-598D-4F83-A756-51EBC30585EA}"/>
+              </a:ext>
+            </a:extLst>
+          </p:cNvPr>
+          <p:cNvPicPr>
+            <a:picLocks noChangeAspect="1"/>
+          </p:cNvPicPr>
+          <p:nvPr/>
+        </p:nvPicPr>
+        <p:blipFill>
+          <a:blip r:embed="rId3">
+            <a:extLst>
+              <a:ext uri="{28A0092B-C50C-407E-A947-70E740481C1C}">
+                <a14:useLocalDpi xmlns:a14="http://schemas.microsoft.com/office/drawing/2010/main" val="0"/>
+              </a:ext>
+            </a:extLst>
+          </a:blip>
+          <a:stretch>
+            <a:fillRect/>
+          </a:stretch>
+        </p:blipFill>
+        <p:spPr>
+          <a:xfrm>
+            <a:off x="2497841" y="1690688"/>
+            <a:ext cx="2390515" cy="4422710"/>
+          </a:xfrm>
+          <a:prstGeom prst="rect">
+            <a:avLst/>
+          </a:prstGeom>
+        </p:spPr>
+      </p:pic>
+      <p:pic>
+        <p:nvPicPr>
+          <p:cNvPr id="36" name="그림 35" descr="스크린샷, 휴대폰, 전화, 모니터이(가) 표시된 사진&#10;&#10;자동 생성된 설명">
+            <a:extLst>
+              <a:ext uri="{FF2B5EF4-FFF2-40B4-BE49-F238E27FC236}">
+                <a16:creationId xmlns:a16="http://schemas.microsoft.com/office/drawing/2014/main" id="{4426EADD-0E25-462A-974A-711E739A61BC}"/>
+              </a:ext>
+            </a:extLst>
+          </p:cNvPr>
+          <p:cNvPicPr>
+            <a:picLocks noChangeAspect="1"/>
+          </p:cNvPicPr>
+          <p:nvPr/>
+        </p:nvPicPr>
+        <p:blipFill>
+          <a:blip r:embed="rId4">
+            <a:extLst>
+              <a:ext uri="{28A0092B-C50C-407E-A947-70E740481C1C}">
+                <a14:useLocalDpi xmlns:a14="http://schemas.microsoft.com/office/drawing/2010/main" val="0"/>
+              </a:ext>
+            </a:extLst>
+          </a:blip>
+          <a:stretch>
+            <a:fillRect/>
+          </a:stretch>
+        </p:blipFill>
+        <p:spPr>
+          <a:xfrm>
+            <a:off x="7278871" y="1690688"/>
+            <a:ext cx="2390515" cy="4422710"/>
+          </a:xfrm>
+          <a:prstGeom prst="rect">
+            <a:avLst/>
+          </a:prstGeom>
+        </p:spPr>
+      </p:pic>
+      <p:pic>
+        <p:nvPicPr>
+          <p:cNvPr id="38" name="그림 37" descr="스크린샷, 전화, 모니터이(가) 표시된 사진&#10;&#10;자동 생성된 설명">
+            <a:extLst>
+              <a:ext uri="{FF2B5EF4-FFF2-40B4-BE49-F238E27FC236}">
+                <a16:creationId xmlns:a16="http://schemas.microsoft.com/office/drawing/2014/main" id="{C7AFDA0A-E656-477A-BD8F-95FE8D7001DA}"/>
+              </a:ext>
+            </a:extLst>
+          </p:cNvPr>
+          <p:cNvPicPr>
+            <a:picLocks noChangeAspect="1"/>
+          </p:cNvPicPr>
+          <p:nvPr/>
+        </p:nvPicPr>
+        <p:blipFill>
+          <a:blip r:embed="rId5">
+            <a:extLst>
+              <a:ext uri="{28A0092B-C50C-407E-A947-70E740481C1C}">
+                <a14:useLocalDpi xmlns:a14="http://schemas.microsoft.com/office/drawing/2010/main" val="0"/>
+              </a:ext>
+            </a:extLst>
+          </a:blip>
+          <a:stretch>
+            <a:fillRect/>
+          </a:stretch>
+        </p:blipFill>
+        <p:spPr>
+          <a:xfrm>
+            <a:off x="107326" y="1690688"/>
+            <a:ext cx="2390515" cy="4422710"/>
+          </a:xfrm>
+          <a:prstGeom prst="rect">
+            <a:avLst/>
+          </a:prstGeom>
+        </p:spPr>
+      </p:pic>
+      <p:pic>
+        <p:nvPicPr>
+          <p:cNvPr id="40" name="그림 39" descr="스크린샷, 모니터, 전화, 휴대폰이(가) 표시된 사진&#10;&#10;자동 생성된 설명">
+            <a:extLst>
+              <a:ext uri="{FF2B5EF4-FFF2-40B4-BE49-F238E27FC236}">
+                <a16:creationId xmlns:a16="http://schemas.microsoft.com/office/drawing/2014/main" id="{28667F34-F57E-4A88-ABF0-52B57145F6D2}"/>
+              </a:ext>
+            </a:extLst>
+          </p:cNvPr>
+          <p:cNvPicPr>
+            <a:picLocks noChangeAspect="1"/>
+          </p:cNvPicPr>
+          <p:nvPr/>
+        </p:nvPicPr>
+        <p:blipFill>
+          <a:blip r:embed="rId6">
+            <a:extLst>
+              <a:ext uri="{28A0092B-C50C-407E-A947-70E740481C1C}">
+                <a14:useLocalDpi xmlns:a14="http://schemas.microsoft.com/office/drawing/2010/main" val="0"/>
+              </a:ext>
+            </a:extLst>
+          </a:blip>
+          <a:stretch>
+            <a:fillRect/>
+          </a:stretch>
+        </p:blipFill>
+        <p:spPr>
+          <a:xfrm>
+            <a:off x="9669386" y="1690688"/>
+            <a:ext cx="2390515" cy="4422710"/>
+          </a:xfrm>
+          <a:prstGeom prst="rect">
+            <a:avLst/>
+          </a:prstGeom>
+        </p:spPr>
+      </p:pic>
+      <p:sp>
+        <p:nvSpPr>
+          <p:cNvPr id="41" name="TextBox 40">
+            <a:extLst>
+              <a:ext uri="{FF2B5EF4-FFF2-40B4-BE49-F238E27FC236}">
+                <a16:creationId xmlns:a16="http://schemas.microsoft.com/office/drawing/2014/main" id="{44489EDA-3B25-47BB-8305-9FF7E8B94125}"/>
+              </a:ext>
+            </a:extLst>
+          </p:cNvPr>
+          <p:cNvSpPr txBox="1"/>
+          <p:nvPr/>
+        </p:nvSpPr>
+        <p:spPr>
+          <a:xfrm>
+            <a:off x="109205" y="6123543"/>
+            <a:ext cx="11950696" cy="369332"/>
+          </a:xfrm>
+          <a:prstGeom prst="rect">
+            <a:avLst/>
+          </a:prstGeom>
+          <a:noFill/>
+        </p:spPr>
+        <p:txBody>
+          <a:bodyPr wrap="square" rtlCol="0">
+            <a:spAutoFit/>
+          </a:bodyPr>
+          <a:lstStyle/>
+          <a:p>
+            <a:r>
+              <a:rPr lang="en-US" altLang="ko-KR" dirty="0"/>
+              <a:t>       First boot              </a:t>
+            </a:r>
+            <a:r>
+              <a:rPr lang="en-US" altLang="ko-KR" dirty="0" err="1"/>
+              <a:t>WelcomeToast</a:t>
+            </a:r>
+            <a:r>
+              <a:rPr lang="en-US" altLang="ko-KR" dirty="0"/>
+              <a:t>         Change Nickname    </a:t>
+            </a:r>
+            <a:r>
+              <a:rPr lang="en-US" altLang="ko-KR" sz="1200" dirty="0"/>
+              <a:t>Toast About Changed Nickname</a:t>
+            </a:r>
+            <a:r>
+              <a:rPr lang="en-US" altLang="ko-KR" dirty="0"/>
+              <a:t>       Status Window</a:t>
+            </a:r>
+            <a:endParaRPr lang="ko-KR" altLang="en-US" dirty="0"/>
           </a:p>
         </p:txBody>
       </p:sp>
@@ -5058,7 +5116,10 @@
           <a:bodyPr/>
           <a:lstStyle/>
           <a:p>
-            <a:endParaRPr lang="ko-KR" altLang="en-US"/>
+            <a:r>
+              <a:rPr lang="ko-KR" altLang="en-US" dirty="0"/>
+              <a:t>흐름도와 중복됨</a:t>
+            </a:r>
           </a:p>
         </p:txBody>
       </p:sp>
@@ -5097,7 +5158,7 @@
           <p:cNvPr id="2" name="제목 1">
             <a:extLst>
               <a:ext uri="{FF2B5EF4-FFF2-40B4-BE49-F238E27FC236}">
-                <a16:creationId xmlns:a16="http://schemas.microsoft.com/office/drawing/2014/main" id="{C07B4212-814C-489D-8DCA-ACD450BEF7CF}"/>
+                <a16:creationId xmlns:a16="http://schemas.microsoft.com/office/drawing/2014/main" id="{E8D9A388-2E59-4EB1-9343-3D0B67EFF246}"/>
               </a:ext>
             </a:extLst>
           </p:cNvPr>
@@ -5115,48 +5176,128 @@
           <a:p>
             <a:r>
               <a:rPr lang="ko-KR" altLang="en-US" dirty="0"/>
-              <a:t>구현 내용 </a:t>
+              <a:t>후기</a:t>
+            </a:r>
+          </a:p>
+        </p:txBody>
+      </p:sp>
+      <p:sp>
+        <p:nvSpPr>
+          <p:cNvPr id="3" name="내용 개체 틀 2">
+            <a:extLst>
+              <a:ext uri="{FF2B5EF4-FFF2-40B4-BE49-F238E27FC236}">
+                <a16:creationId xmlns:a16="http://schemas.microsoft.com/office/drawing/2014/main" id="{7AB142D8-329A-489E-83AB-235A7C9456FD}"/>
+              </a:ext>
+            </a:extLst>
+          </p:cNvPr>
+          <p:cNvSpPr>
+            <a:spLocks noGrp="1"/>
+          </p:cNvSpPr>
+          <p:nvPr>
+            <p:ph idx="1"/>
+          </p:nvPr>
+        </p:nvSpPr>
+        <p:spPr/>
+        <p:txBody>
+          <a:bodyPr/>
+          <a:lstStyle/>
+          <a:p>
+            <a:r>
+              <a:rPr lang="ko-KR" altLang="en-US" dirty="0"/>
+              <a:t>구현 하기로 한 목표인 </a:t>
             </a:r>
             <a:r>
               <a:rPr lang="en-US" altLang="ko-KR" dirty="0"/>
-              <a:t>- </a:t>
+              <a:t>Status</a:t>
             </a:r>
             <a:r>
               <a:rPr lang="ko-KR" altLang="en-US" dirty="0"/>
-              <a:t>실행</a:t>
-            </a:r>
-          </a:p>
-        </p:txBody>
-      </p:sp>
-      <p:sp>
-        <p:nvSpPr>
-          <p:cNvPr id="3" name="내용 개체 틀 2">
-            <a:extLst>
-              <a:ext uri="{FF2B5EF4-FFF2-40B4-BE49-F238E27FC236}">
-                <a16:creationId xmlns:a16="http://schemas.microsoft.com/office/drawing/2014/main" id="{9BA5D9A5-7039-4CD3-A062-F0A22644AC07}"/>
-              </a:ext>
-            </a:extLst>
-          </p:cNvPr>
-          <p:cNvSpPr>
-            <a:spLocks noGrp="1"/>
-          </p:cNvSpPr>
-          <p:nvPr>
-            <p:ph idx="1"/>
-          </p:nvPr>
-        </p:nvSpPr>
-        <p:spPr/>
-        <p:txBody>
-          <a:bodyPr/>
-          <a:lstStyle/>
-          <a:p>
-            <a:endParaRPr lang="ko-KR" altLang="en-US"/>
+              <a:t>에서도 </a:t>
+            </a:r>
+            <a:endParaRPr lang="en-US" altLang="ko-KR" dirty="0"/>
+          </a:p>
+          <a:p>
+            <a:pPr lvl="1"/>
+            <a:r>
+              <a:rPr lang="ko-KR" altLang="en-US" dirty="0"/>
+              <a:t>간단한 정보 </a:t>
+            </a:r>
+            <a:r>
+              <a:rPr lang="en-US" altLang="ko-KR" dirty="0"/>
+              <a:t>: </a:t>
+            </a:r>
+            <a:r>
+              <a:rPr lang="ko-KR" altLang="en-US" dirty="0"/>
+              <a:t>구현완료</a:t>
+            </a:r>
+            <a:endParaRPr lang="en-US" altLang="ko-KR" dirty="0"/>
+          </a:p>
+          <a:p>
+            <a:pPr lvl="1"/>
+            <a:r>
+              <a:rPr lang="en-US" altLang="ko-KR" dirty="0"/>
+              <a:t> </a:t>
+            </a:r>
+            <a:r>
+              <a:rPr lang="ko-KR" altLang="en-US" dirty="0"/>
+              <a:t>세부 정보 </a:t>
+            </a:r>
+            <a:r>
+              <a:rPr lang="en-US" altLang="ko-KR" dirty="0"/>
+              <a:t>: </a:t>
+            </a:r>
+            <a:r>
+              <a:rPr lang="ko-KR" altLang="en-US" dirty="0" err="1"/>
+              <a:t>미구현</a:t>
+            </a:r>
+            <a:endParaRPr lang="en-US" altLang="ko-KR" dirty="0"/>
+          </a:p>
+          <a:p>
+            <a:r>
+              <a:rPr lang="en-US" altLang="ko-KR" dirty="0"/>
+              <a:t>Skill </a:t>
+            </a:r>
+            <a:r>
+              <a:rPr lang="ko-KR" altLang="en-US" dirty="0"/>
+              <a:t>또한 </a:t>
+            </a:r>
+            <a:r>
+              <a:rPr lang="ko-KR" altLang="en-US" dirty="0" err="1"/>
+              <a:t>미구현</a:t>
+            </a:r>
+            <a:endParaRPr lang="en-US" altLang="ko-KR" dirty="0"/>
+          </a:p>
+          <a:p>
+            <a:endParaRPr lang="en-US" altLang="ko-KR" dirty="0"/>
+          </a:p>
+          <a:p>
+            <a:r>
+              <a:rPr lang="ko-KR" altLang="en-US" dirty="0"/>
+              <a:t>생각 외로 간단하게 </a:t>
+            </a:r>
+            <a:r>
+              <a:rPr lang="en-US" altLang="ko-KR" dirty="0"/>
+              <a:t>Status Ability Point</a:t>
+            </a:r>
+            <a:r>
+              <a:rPr lang="ko-KR" altLang="en-US" dirty="0"/>
+              <a:t>를 </a:t>
+            </a:r>
+            <a:r>
+              <a:rPr lang="ko-KR" altLang="en-US" dirty="0" err="1"/>
+              <a:t>구현하는것만으로도</a:t>
+            </a:r>
+            <a:r>
+              <a:rPr lang="ko-KR" altLang="en-US" dirty="0"/>
+              <a:t> 시간이 많이 걸림</a:t>
+            </a:r>
           </a:p>
         </p:txBody>
       </p:sp>
     </p:spTree>
     <p:extLst>
       <p:ext uri="{BB962C8B-B14F-4D97-AF65-F5344CB8AC3E}">
-        <p14:creationId xmlns:p14="http://schemas.microsoft.com/office/powerpoint/2010/main" val="4115240989"/>
+        <p14:creationId xmlns:p14="http://schemas.microsoft.com/office/powerpoint/2010/main" val="1446599164"/>
       </p:ext>
     </p:extLst>
   </p:cSld>

</xml_diff>